<commit_message>
edited code for presentation creation
</commit_message>
<xml_diff>
--- a/src/notebooks/fpse-presentation.pptx
+++ b/src/notebooks/fpse-presentation.pptx
@@ -7,6 +7,9 @@
   <p:sldIdLst>
     <p:sldId id="256" r:id="rId2"/>
     <p:sldId id="257" r:id="rId3"/>
+    <p:sldId id="258" r:id="rId4"/>
+    <p:sldId id="259" r:id="rId5"/>
+    <p:sldId id="260" r:id="rId6"/>
   </p:sldIdLst>
   <p:sldSz cx="9144000" cy="6858000" type="screen4x3"/>
   <p:notesSz cx="6858000" cy="9144000"/>
@@ -3405,15 +3408,6 @@
           <a:bodyPr/>
           <a:lstStyle/>
           <a:p>
-            <a:pPr lvl="0" marL="0" indent="0">
-              <a:buNone/>
-            </a:pPr>
-            <a:r>
-              <a:rPr/>
-              <a:t>`</a:t>
-            </a:r>
-          </a:p>
-          <a:p>
             <a:pPr lvl="0" marL="1270000" indent="0">
               <a:buNone/>
             </a:pPr>
@@ -3421,7 +3415,7 @@
               <a:rPr sz="1800">
                 <a:latin typeface="Courier"/>
               </a:rPr>
-              <a:t>## [1] "20 Total Crimes in 2019"</a:t>
+              <a:t>## [1] "20 total crimes in August 2019"</a:t>
             </a:r>
           </a:p>
           <a:p>
@@ -3432,7 +3426,281 @@
               <a:rPr sz="1800">
                 <a:latin typeface="Courier"/>
               </a:rPr>
-              <a:t>## [1] "11.11 Percent Change compared to August 2018 (18 Total Crimes)"</a:t>
+              <a:t>## [1] "11.1% change compared to August 2018 (18 total crimes)"</a:t>
+            </a:r>
+          </a:p>
+          <a:p>
+            <a:pPr lvl="0" marL="1270000" indent="0">
+              <a:buNone/>
+            </a:pPr>
+            <a:r>
+              <a:rPr sz="1800">
+                <a:latin typeface="Courier"/>
+              </a:rPr>
+              <a:t>## [1] "1 crime(s) against persons in August 2019"</a:t>
+            </a:r>
+          </a:p>
+          <a:p>
+            <a:pPr lvl="0" marL="1270000" indent="0">
+              <a:buNone/>
+            </a:pPr>
+            <a:r>
+              <a:rPr sz="1800">
+                <a:latin typeface="Courier"/>
+              </a:rPr>
+              <a:t>## [1] "-75.0% change compared to August 2018 (4 crimes against persons)"</a:t>
+            </a:r>
+          </a:p>
+          <a:p>
+            <a:pPr lvl="0" marL="1270000" indent="0">
+              <a:buNone/>
+            </a:pPr>
+            <a:r>
+              <a:rPr sz="1800">
+                <a:latin typeface="Courier"/>
+              </a:rPr>
+              <a:t>## [1] "166 total crimes in 2019"</a:t>
+            </a:r>
+          </a:p>
+          <a:p>
+            <a:pPr lvl="0" marL="1270000" indent="0">
+              <a:buNone/>
+            </a:pPr>
+            <a:r>
+              <a:rPr sz="1800">
+                <a:latin typeface="Courier"/>
+              </a:rPr>
+              <a:t>## [1] "25.8% change compared to this time in 2018 (132 total crimes)"</a:t>
+            </a:r>
+          </a:p>
+          <a:p>
+            <a:pPr lvl="0" marL="1270000" indent="0">
+              <a:buNone/>
+            </a:pPr>
+            <a:r>
+              <a:rPr sz="1800">
+                <a:latin typeface="Courier"/>
+              </a:rPr>
+              <a:t>## [1] "27 crime(s) against persons in 2019"</a:t>
+            </a:r>
+          </a:p>
+          <a:p>
+            <a:pPr lvl="0" marL="1270000" indent="0">
+              <a:buNone/>
+            </a:pPr>
+            <a:r>
+              <a:rPr sz="1800">
+                <a:latin typeface="Courier"/>
+              </a:rPr>
+              <a:t>## [1] "-20.6% change compared to this time in 2018 (34 crimes against persons)"</a:t>
+            </a:r>
+          </a:p>
+        </p:txBody>
+      </p:sp>
+    </p:spTree>
+  </p:cSld>
+</p:sld>
+</file>
+
+<file path=ppt/slides/slide3.xml><?xml version="1.0" encoding="utf-8"?>
+<p:sld xmlns:a="http://schemas.openxmlformats.org/drawingml/2006/main" xmlns:r="http://schemas.openxmlformats.org/officeDocument/2006/relationships" xmlns:p="http://schemas.openxmlformats.org/presentationml/2006/main">
+  <p:cSld>
+    <p:spTree>
+      <p:nvGrpSpPr>
+        <p:cNvPr id="1" name=""/>
+        <p:cNvGrpSpPr/>
+        <p:nvPr/>
+      </p:nvGrpSpPr>
+      <p:grpSpPr>
+        <a:xfrm>
+          <a:off x="0" y="0"/>
+          <a:ext cx="0" cy="0"/>
+          <a:chOff x="0" y="0"/>
+          <a:chExt cx="0" cy="0"/>
+        </a:xfrm>
+      </p:grpSpPr>
+      <p:sp>
+        <p:nvSpPr>
+          <p:cNvPr id="2" name="Title 1"/>
+          <p:cNvSpPr>
+            <a:spLocks noGrp="1"/>
+          </p:cNvSpPr>
+          <p:nvPr>
+            <p:ph type="title"/>
+          </p:nvPr>
+        </p:nvSpPr>
+        <p:spPr/>
+        <p:txBody>
+          <a:bodyPr/>
+          <a:lstStyle/>
+          <a:p>
+            <a:pPr lvl="0" marL="0" indent="0">
+              <a:buNone/>
+            </a:pPr>
+            <a:r>
+              <a:rPr/>
+              <a:t>Comparing</a:t>
+            </a:r>
+            <a:r>
+              <a:rPr/>
+              <a:t> </a:t>
+            </a:r>
+            <a:r>
+              <a:rPr/>
+              <a:t>2018</a:t>
+            </a:r>
+            <a:r>
+              <a:rPr/>
+              <a:t> </a:t>
+            </a:r>
+            <a:r>
+              <a:rPr/>
+              <a:t>to</a:t>
+            </a:r>
+            <a:r>
+              <a:rPr/>
+              <a:t> </a:t>
+            </a:r>
+            <a:r>
+              <a:rPr/>
+              <a:t>2019</a:t>
+            </a:r>
+          </a:p>
+        </p:txBody>
+      </p:sp>
+      <p:pic>
+        <p:nvPicPr>
+          <p:cNvPr descr="fpse_2018.jpeg" id="0" name="Picture 1"/>
+          <p:cNvPicPr>
+            <a:picLocks noGrp="1" noChangeAspect="1"/>
+          </p:cNvPicPr>
+          <p:nvPr/>
+        </p:nvPicPr>
+        <p:blipFill>
+          <a:blip r:embed="rId2"/>
+          <a:stretch>
+            <a:fillRect/>
+          </a:stretch>
+        </p:blipFill>
+        <p:spPr bwMode="auto">
+          <a:xfrm>
+            <a:off x="457200" y="2590800"/>
+            <a:ext cx="8229600" cy="2540000"/>
+          </a:xfrm>
+          <a:prstGeom prst="rect">
+            <a:avLst/>
+          </a:prstGeom>
+          <a:noFill/>
+          <a:ln w="9525">
+            <a:noFill/>
+            <a:headEnd/>
+            <a:tailEnd/>
+          </a:ln>
+        </p:spPr>
+      </p:pic>
+    </p:spTree>
+  </p:cSld>
+</p:sld>
+</file>
+
+<file path=ppt/slides/slide4.xml><?xml version="1.0" encoding="utf-8"?>
+<p:sld xmlns:a="http://schemas.openxmlformats.org/drawingml/2006/main" xmlns:r="http://schemas.openxmlformats.org/officeDocument/2006/relationships" xmlns:p="http://schemas.openxmlformats.org/presentationml/2006/main">
+  <p:cSld>
+    <p:spTree>
+      <p:nvGrpSpPr>
+        <p:cNvPr id="1" name=""/>
+        <p:cNvGrpSpPr/>
+        <p:nvPr/>
+      </p:nvGrpSpPr>
+      <p:grpSpPr>
+        <a:xfrm>
+          <a:off x="0" y="0"/>
+          <a:ext cx="0" cy="0"/>
+          <a:chOff x="0" y="0"/>
+          <a:chExt cx="0" cy="0"/>
+        </a:xfrm>
+      </p:grpSpPr>
+      <p:pic>
+        <p:nvPicPr>
+          <p:cNvPr descr="fpse_2019.jpeg" id="0" name="Picture 1"/>
+          <p:cNvPicPr>
+            <a:picLocks noGrp="1" noChangeAspect="1"/>
+          </p:cNvPicPr>
+          <p:nvPr/>
+        </p:nvPicPr>
+        <p:blipFill>
+          <a:blip r:embed="rId2"/>
+          <a:stretch>
+            <a:fillRect/>
+          </a:stretch>
+        </p:blipFill>
+        <p:spPr bwMode="auto">
+          <a:xfrm>
+            <a:off x="457200" y="2070100"/>
+            <a:ext cx="8229600" cy="3581400"/>
+          </a:xfrm>
+          <a:prstGeom prst="rect">
+            <a:avLst/>
+          </a:prstGeom>
+          <a:noFill/>
+          <a:ln w="9525">
+            <a:noFill/>
+            <a:headEnd/>
+            <a:tailEnd/>
+          </a:ln>
+        </p:spPr>
+      </p:pic>
+    </p:spTree>
+  </p:cSld>
+</p:sld>
+</file>
+
+<file path=ppt/slides/slide5.xml><?xml version="1.0" encoding="utf-8"?>
+<p:sld xmlns:a="http://schemas.openxmlformats.org/drawingml/2006/main" xmlns:r="http://schemas.openxmlformats.org/officeDocument/2006/relationships" xmlns:p="http://schemas.openxmlformats.org/presentationml/2006/main">
+  <p:cSld>
+    <p:spTree>
+      <p:nvGrpSpPr>
+        <p:cNvPr id="1" name=""/>
+        <p:cNvGrpSpPr/>
+        <p:nvPr/>
+      </p:nvGrpSpPr>
+      <p:grpSpPr>
+        <a:xfrm>
+          <a:off x="0" y="0"/>
+          <a:ext cx="0" cy="0"/>
+          <a:chOff x="0" y="0"/>
+          <a:chExt cx="0" cy="0"/>
+        </a:xfrm>
+      </p:grpSpPr>
+      <p:sp>
+        <p:nvSpPr>
+          <p:cNvPr id="3" name="Content Placeholder 2"/>
+          <p:cNvSpPr>
+            <a:spLocks noGrp="1"/>
+          </p:cNvSpPr>
+          <p:nvPr>
+            <p:ph idx="1"/>
+          </p:nvPr>
+        </p:nvSpPr>
+        <p:spPr/>
+        <p:txBody>
+          <a:bodyPr/>
+          <a:lstStyle/>
+          <a:p>
+            <a:pPr lvl="0" marL="0" indent="0">
+              <a:buNone/>
+            </a:pPr>
+          </a:p>
+          <a:p>
+            <a:pPr lvl="0" marL="0" indent="0">
+              <a:spcBef>
+                <a:spcPts val="3000"/>
+              </a:spcBef>
+              <a:buNone/>
+            </a:pPr>
+            <a:r>
+              <a:rPr b="1"/>
+              <a:t>Forest Park Southeast 2019</a:t>
             </a:r>
           </a:p>
         </p:txBody>

</xml_diff>

<commit_message>
edit to Rmd for fpse presentation
</commit_message>
<xml_diff>
--- a/src/notebooks/fpse-presentation.pptx
+++ b/src/notebooks/fpse-presentation.pptx
@@ -10,6 +10,20 @@
     <p:sldId id="258" r:id="rId4"/>
     <p:sldId id="259" r:id="rId5"/>
     <p:sldId id="260" r:id="rId6"/>
+    <p:sldId id="261" r:id="rId7"/>
+    <p:sldId id="262" r:id="rId8"/>
+    <p:sldId id="263" r:id="rId9"/>
+    <p:sldId id="264" r:id="rId10"/>
+    <p:sldId id="265" r:id="rId11"/>
+    <p:sldId id="266" r:id="rId12"/>
+    <p:sldId id="267" r:id="rId13"/>
+    <p:sldId id="268" r:id="rId14"/>
+    <p:sldId id="269" r:id="rId15"/>
+    <p:sldId id="270" r:id="rId16"/>
+    <p:sldId id="271" r:id="rId17"/>
+    <p:sldId id="272" r:id="rId18"/>
+    <p:sldId id="273" r:id="rId19"/>
+    <p:sldId id="274" r:id="rId20"/>
   </p:sldIdLst>
   <p:sldSz cx="9144000" cy="6858000" type="screen4x3"/>
   <p:notesSz cx="6858000" cy="9144000"/>
@@ -3301,7 +3315,7 @@
             </a:r>
             <a:r>
               <a:rPr/>
-              <a:t>23,</a:t>
+              <a:t>24,</a:t>
             </a:r>
             <a:r>
               <a:rPr/>
@@ -3310,6 +3324,847 @@
             <a:r>
               <a:rPr/>
               <a:t>2019)</a:t>
+            </a:r>
+          </a:p>
+        </p:txBody>
+      </p:sp>
+    </p:spTree>
+  </p:cSld>
+</p:sld>
+</file>
+
+<file path=ppt/slides/slide10.xml><?xml version="1.0" encoding="utf-8"?>
+<p:sld xmlns:a="http://schemas.openxmlformats.org/drawingml/2006/main" xmlns:r="http://schemas.openxmlformats.org/officeDocument/2006/relationships" xmlns:p="http://schemas.openxmlformats.org/presentationml/2006/main">
+  <p:cSld>
+    <p:spTree>
+      <p:nvGrpSpPr>
+        <p:cNvPr id="1" name=""/>
+        <p:cNvGrpSpPr/>
+        <p:nvPr/>
+      </p:nvGrpSpPr>
+      <p:grpSpPr>
+        <a:xfrm>
+          <a:off x="0" y="0"/>
+          <a:ext cx="0" cy="0"/>
+          <a:chOff x="0" y="0"/>
+          <a:chExt cx="0" cy="0"/>
+        </a:xfrm>
+      </p:grpSpPr>
+      <p:sp>
+        <p:nvSpPr>
+          <p:cNvPr id="2" name="Title 1"/>
+          <p:cNvSpPr>
+            <a:spLocks noGrp="1"/>
+          </p:cNvSpPr>
+          <p:nvPr>
+            <p:ph type="title"/>
+          </p:nvPr>
+        </p:nvSpPr>
+        <p:spPr/>
+        <p:txBody>
+          <a:bodyPr/>
+          <a:lstStyle/>
+          <a:p>
+            <a:pPr lvl="0" marL="0" indent="0">
+              <a:buNone/>
+            </a:pPr>
+            <a:r>
+              <a:rPr/>
+              <a:t>Summary</a:t>
+            </a:r>
+            <a:r>
+              <a:rPr/>
+              <a:t> </a:t>
+            </a:r>
+            <a:r>
+              <a:rPr/>
+              <a:t>Notes:</a:t>
+            </a:r>
+            <a:r>
+              <a:rPr/>
+              <a:t> </a:t>
+            </a:r>
+            <a:r>
+              <a:rPr/>
+              <a:t>Botanical</a:t>
+            </a:r>
+            <a:r>
+              <a:rPr/>
+              <a:t> </a:t>
+            </a:r>
+            <a:r>
+              <a:rPr/>
+              <a:t>Heights</a:t>
+            </a:r>
+          </a:p>
+        </p:txBody>
+      </p:sp>
+      <p:sp>
+        <p:nvSpPr>
+          <p:cNvPr id="3" name="Content Placeholder 2"/>
+          <p:cNvSpPr>
+            <a:spLocks noGrp="1"/>
+          </p:cNvSpPr>
+          <p:nvPr>
+            <p:ph idx="1"/>
+          </p:nvPr>
+        </p:nvSpPr>
+        <p:spPr/>
+        <p:txBody>
+          <a:bodyPr/>
+          <a:lstStyle/>
+          <a:p>
+            <a:pPr lvl="0" marL="1270000" indent="0">
+              <a:buNone/>
+            </a:pPr>
+            <a:r>
+              <a:rPr sz="1800">
+                <a:latin typeface="Courier"/>
+              </a:rPr>
+              <a:t>## [1] "4 total crimes in August 2019"</a:t>
+            </a:r>
+          </a:p>
+          <a:p>
+            <a:pPr lvl="0" marL="1270000" indent="0">
+              <a:buNone/>
+            </a:pPr>
+            <a:r>
+              <a:rPr sz="1800">
+                <a:latin typeface="Courier"/>
+              </a:rPr>
+              <a:t>## [1] "-77.8% change compared to August 2018 (18 total crimes)"</a:t>
+            </a:r>
+          </a:p>
+          <a:p>
+            <a:pPr lvl="0" marL="1270000" indent="0">
+              <a:buNone/>
+            </a:pPr>
+            <a:r>
+              <a:rPr sz="1800">
+                <a:latin typeface="Courier"/>
+              </a:rPr>
+              <a:t>## [1] "1 crime(s) against persons in August 2019"</a:t>
+            </a:r>
+          </a:p>
+          <a:p>
+            <a:pPr lvl="0" marL="1270000" indent="0">
+              <a:buNone/>
+            </a:pPr>
+            <a:r>
+              <a:rPr sz="1800">
+                <a:latin typeface="Courier"/>
+              </a:rPr>
+              <a:t>## [1] "0% change compared to August 2018 (1 crimes against persons)"</a:t>
+            </a:r>
+          </a:p>
+          <a:p>
+            <a:pPr lvl="0" marL="1270000" indent="0">
+              <a:buNone/>
+            </a:pPr>
+            <a:r>
+              <a:rPr sz="1800">
+                <a:latin typeface="Courier"/>
+              </a:rPr>
+              <a:t>## [1] "53 total crimes in 2019"</a:t>
+            </a:r>
+          </a:p>
+          <a:p>
+            <a:pPr lvl="0" marL="1270000" indent="0">
+              <a:buNone/>
+            </a:pPr>
+            <a:r>
+              <a:rPr sz="1800">
+                <a:latin typeface="Courier"/>
+              </a:rPr>
+              <a:t>## [1] "-32.1% change compared to this time in 2018 (78 total crimes)"</a:t>
+            </a:r>
+          </a:p>
+          <a:p>
+            <a:pPr lvl="0" marL="1270000" indent="0">
+              <a:buNone/>
+            </a:pPr>
+            <a:r>
+              <a:rPr sz="1800">
+                <a:latin typeface="Courier"/>
+              </a:rPr>
+              <a:t>## [1] "9 crime(s) against persons in 2019"</a:t>
+            </a:r>
+          </a:p>
+          <a:p>
+            <a:pPr lvl="0" marL="1270000" indent="0">
+              <a:buNone/>
+            </a:pPr>
+            <a:r>
+              <a:rPr sz="1800">
+                <a:latin typeface="Courier"/>
+              </a:rPr>
+              <a:t>## [1] "28.6% change compared to this time in 2018 (7 crimes against persons)"</a:t>
+            </a:r>
+          </a:p>
+        </p:txBody>
+      </p:sp>
+    </p:spTree>
+  </p:cSld>
+</p:sld>
+</file>
+
+<file path=ppt/slides/slide11.xml><?xml version="1.0" encoding="utf-8"?>
+<p:sld xmlns:a="http://schemas.openxmlformats.org/drawingml/2006/main" xmlns:r="http://schemas.openxmlformats.org/officeDocument/2006/relationships" xmlns:p="http://schemas.openxmlformats.org/presentationml/2006/main">
+  <p:cSld>
+    <p:spTree>
+      <p:nvGrpSpPr>
+        <p:cNvPr id="1" name=""/>
+        <p:cNvGrpSpPr/>
+        <p:nvPr/>
+      </p:nvGrpSpPr>
+      <p:grpSpPr>
+        <a:xfrm>
+          <a:off x="0" y="0"/>
+          <a:ext cx="0" cy="0"/>
+          <a:chOff x="0" y="0"/>
+          <a:chExt cx="0" cy="0"/>
+        </a:xfrm>
+      </p:grpSpPr>
+      <p:sp>
+        <p:nvSpPr>
+          <p:cNvPr id="2" name="Title 1"/>
+          <p:cNvSpPr>
+            <a:spLocks noGrp="1"/>
+          </p:cNvSpPr>
+          <p:nvPr>
+            <p:ph type="title"/>
+          </p:nvPr>
+        </p:nvSpPr>
+        <p:spPr/>
+        <p:txBody>
+          <a:bodyPr/>
+          <a:lstStyle/>
+          <a:p>
+            <a:pPr lvl="0" marL="0" indent="0">
+              <a:buNone/>
+            </a:pPr>
+            <a:r>
+              <a:rPr/>
+              <a:t>Comparing</a:t>
+            </a:r>
+            <a:r>
+              <a:rPr/>
+              <a:t> </a:t>
+            </a:r>
+            <a:r>
+              <a:rPr/>
+              <a:t>2018</a:t>
+            </a:r>
+            <a:r>
+              <a:rPr/>
+              <a:t> </a:t>
+            </a:r>
+            <a:r>
+              <a:rPr/>
+              <a:t>to</a:t>
+            </a:r>
+            <a:r>
+              <a:rPr/>
+              <a:t> </a:t>
+            </a:r>
+            <a:r>
+              <a:rPr/>
+              <a:t>2019:</a:t>
+            </a:r>
+            <a:r>
+              <a:rPr/>
+              <a:t> </a:t>
+            </a:r>
+            <a:r>
+              <a:rPr/>
+              <a:t>Botanical</a:t>
+            </a:r>
+            <a:r>
+              <a:rPr/>
+              <a:t> </a:t>
+            </a:r>
+            <a:r>
+              <a:rPr/>
+              <a:t>Heights</a:t>
+            </a:r>
+          </a:p>
+        </p:txBody>
+      </p:sp>
+      <p:pic>
+        <p:nvPicPr>
+          <p:cNvPr descr="bot_2018.jpeg" id="0" name="Picture 1"/>
+          <p:cNvPicPr>
+            <a:picLocks noGrp="1" noChangeAspect="1"/>
+          </p:cNvPicPr>
+          <p:nvPr/>
+        </p:nvPicPr>
+        <p:blipFill>
+          <a:blip r:embed="rId2"/>
+          <a:stretch>
+            <a:fillRect/>
+          </a:stretch>
+        </p:blipFill>
+        <p:spPr bwMode="auto">
+          <a:xfrm>
+            <a:off x="457200" y="2870200"/>
+            <a:ext cx="8229600" cy="1993900"/>
+          </a:xfrm>
+          <a:prstGeom prst="rect">
+            <a:avLst/>
+          </a:prstGeom>
+          <a:noFill/>
+          <a:ln w="9525">
+            <a:noFill/>
+            <a:headEnd/>
+            <a:tailEnd/>
+          </a:ln>
+        </p:spPr>
+      </p:pic>
+    </p:spTree>
+  </p:cSld>
+</p:sld>
+</file>
+
+<file path=ppt/slides/slide12.xml><?xml version="1.0" encoding="utf-8"?>
+<p:sld xmlns:a="http://schemas.openxmlformats.org/drawingml/2006/main" xmlns:r="http://schemas.openxmlformats.org/officeDocument/2006/relationships" xmlns:p="http://schemas.openxmlformats.org/presentationml/2006/main">
+  <p:cSld>
+    <p:spTree>
+      <p:nvGrpSpPr>
+        <p:cNvPr id="1" name=""/>
+        <p:cNvGrpSpPr/>
+        <p:nvPr/>
+      </p:nvGrpSpPr>
+      <p:grpSpPr>
+        <a:xfrm>
+          <a:off x="0" y="0"/>
+          <a:ext cx="0" cy="0"/>
+          <a:chOff x="0" y="0"/>
+          <a:chExt cx="0" cy="0"/>
+        </a:xfrm>
+      </p:grpSpPr>
+      <p:pic>
+        <p:nvPicPr>
+          <p:cNvPr descr="bot_2019.jpeg" id="0" name="Picture 1"/>
+          <p:cNvPicPr>
+            <a:picLocks noGrp="1" noChangeAspect="1"/>
+          </p:cNvPicPr>
+          <p:nvPr/>
+        </p:nvPicPr>
+        <p:blipFill>
+          <a:blip r:embed="rId2"/>
+          <a:stretch>
+            <a:fillRect/>
+          </a:stretch>
+        </p:blipFill>
+        <p:spPr bwMode="auto">
+          <a:xfrm>
+            <a:off x="457200" y="2336800"/>
+            <a:ext cx="8229600" cy="3060700"/>
+          </a:xfrm>
+          <a:prstGeom prst="rect">
+            <a:avLst/>
+          </a:prstGeom>
+          <a:noFill/>
+          <a:ln w="9525">
+            <a:noFill/>
+            <a:headEnd/>
+            <a:tailEnd/>
+          </a:ln>
+        </p:spPr>
+      </p:pic>
+    </p:spTree>
+  </p:cSld>
+</p:sld>
+</file>
+
+<file path=ppt/slides/slide13.xml><?xml version="1.0" encoding="utf-8"?>
+<p:sld xmlns:a="http://schemas.openxmlformats.org/drawingml/2006/main" xmlns:r="http://schemas.openxmlformats.org/officeDocument/2006/relationships" xmlns:p="http://schemas.openxmlformats.org/presentationml/2006/main">
+  <p:cSld>
+    <p:spTree>
+      <p:nvGrpSpPr>
+        <p:cNvPr id="1" name=""/>
+        <p:cNvGrpSpPr/>
+        <p:nvPr/>
+      </p:nvGrpSpPr>
+      <p:grpSpPr>
+        <a:xfrm>
+          <a:off x="0" y="0"/>
+          <a:ext cx="0" cy="0"/>
+          <a:chOff x="0" y="0"/>
+          <a:chExt cx="0" cy="0"/>
+        </a:xfrm>
+      </p:grpSpPr>
+      <p:pic>
+        <p:nvPicPr>
+          <p:cNvPr descr="bot_crimCat.jpeg" id="0" name="Picture 1"/>
+          <p:cNvPicPr>
+            <a:picLocks noGrp="1" noChangeAspect="1"/>
+          </p:cNvPicPr>
+          <p:nvPr/>
+        </p:nvPicPr>
+        <p:blipFill>
+          <a:blip r:embed="rId2"/>
+          <a:stretch>
+            <a:fillRect/>
+          </a:stretch>
+        </p:blipFill>
+        <p:spPr bwMode="auto">
+          <a:xfrm>
+            <a:off x="1587500" y="1600200"/>
+            <a:ext cx="5969000" cy="4521200"/>
+          </a:xfrm>
+          <a:prstGeom prst="rect">
+            <a:avLst/>
+          </a:prstGeom>
+          <a:noFill/>
+          <a:ln w="9525">
+            <a:noFill/>
+            <a:headEnd/>
+            <a:tailEnd/>
+          </a:ln>
+        </p:spPr>
+      </p:pic>
+    </p:spTree>
+  </p:cSld>
+</p:sld>
+</file>
+
+<file path=ppt/slides/slide14.xml><?xml version="1.0" encoding="utf-8"?>
+<p:sld xmlns:a="http://schemas.openxmlformats.org/drawingml/2006/main" xmlns:r="http://schemas.openxmlformats.org/officeDocument/2006/relationships" xmlns:p="http://schemas.openxmlformats.org/presentationml/2006/main">
+  <p:cSld>
+    <p:spTree>
+      <p:nvGrpSpPr>
+        <p:cNvPr id="1" name=""/>
+        <p:cNvGrpSpPr/>
+        <p:nvPr/>
+      </p:nvGrpSpPr>
+      <p:grpSpPr>
+        <a:xfrm>
+          <a:off x="0" y="0"/>
+          <a:ext cx="0" cy="0"/>
+          <a:chOff x="0" y="0"/>
+          <a:chExt cx="0" cy="0"/>
+        </a:xfrm>
+      </p:grpSpPr>
+      <p:pic>
+        <p:nvPicPr>
+          <p:cNvPr descr="bot_weekDay.jpeg" id="0" name="Picture 1"/>
+          <p:cNvPicPr>
+            <a:picLocks noGrp="1" noChangeAspect="1"/>
+          </p:cNvPicPr>
+          <p:nvPr/>
+        </p:nvPicPr>
+        <p:blipFill>
+          <a:blip r:embed="rId2"/>
+          <a:stretch>
+            <a:fillRect/>
+          </a:stretch>
+        </p:blipFill>
+        <p:spPr bwMode="auto">
+          <a:xfrm>
+            <a:off x="838200" y="1600200"/>
+            <a:ext cx="7454900" cy="4521200"/>
+          </a:xfrm>
+          <a:prstGeom prst="rect">
+            <a:avLst/>
+          </a:prstGeom>
+          <a:noFill/>
+          <a:ln w="9525">
+            <a:noFill/>
+            <a:headEnd/>
+            <a:tailEnd/>
+          </a:ln>
+        </p:spPr>
+      </p:pic>
+    </p:spTree>
+  </p:cSld>
+</p:sld>
+</file>
+
+<file path=ppt/slides/slide15.xml><?xml version="1.0" encoding="utf-8"?>
+<p:sld xmlns:a="http://schemas.openxmlformats.org/drawingml/2006/main" xmlns:r="http://schemas.openxmlformats.org/officeDocument/2006/relationships" xmlns:p="http://schemas.openxmlformats.org/presentationml/2006/main">
+  <p:cSld>
+    <p:spTree>
+      <p:nvGrpSpPr>
+        <p:cNvPr id="1" name=""/>
+        <p:cNvGrpSpPr/>
+        <p:nvPr/>
+      </p:nvGrpSpPr>
+      <p:grpSpPr>
+        <a:xfrm>
+          <a:off x="0" y="0"/>
+          <a:ext cx="0" cy="0"/>
+          <a:chOff x="0" y="0"/>
+          <a:chExt cx="0" cy="0"/>
+        </a:xfrm>
+      </p:grpSpPr>
+      <p:pic>
+        <p:nvPicPr>
+          <p:cNvPr descr="bot_violent.jpeg" id="0" name="Picture 1"/>
+          <p:cNvPicPr>
+            <a:picLocks noGrp="1" noChangeAspect="1"/>
+          </p:cNvPicPr>
+          <p:nvPr/>
+        </p:nvPicPr>
+        <p:blipFill>
+          <a:blip r:embed="rId2"/>
+          <a:stretch>
+            <a:fillRect/>
+          </a:stretch>
+        </p:blipFill>
+        <p:spPr bwMode="auto">
+          <a:xfrm>
+            <a:off x="457200" y="2019300"/>
+            <a:ext cx="8229600" cy="3683000"/>
+          </a:xfrm>
+          <a:prstGeom prst="rect">
+            <a:avLst/>
+          </a:prstGeom>
+          <a:noFill/>
+          <a:ln w="9525">
+            <a:noFill/>
+            <a:headEnd/>
+            <a:tailEnd/>
+          </a:ln>
+        </p:spPr>
+      </p:pic>
+    </p:spTree>
+  </p:cSld>
+</p:sld>
+</file>
+
+<file path=ppt/slides/slide16.xml><?xml version="1.0" encoding="utf-8"?>
+<p:sld xmlns:a="http://schemas.openxmlformats.org/drawingml/2006/main" xmlns:r="http://schemas.openxmlformats.org/officeDocument/2006/relationships" xmlns:p="http://schemas.openxmlformats.org/presentationml/2006/main">
+  <p:cSld>
+    <p:spTree>
+      <p:nvGrpSpPr>
+        <p:cNvPr id="1" name=""/>
+        <p:cNvGrpSpPr/>
+        <p:nvPr/>
+      </p:nvGrpSpPr>
+      <p:grpSpPr>
+        <a:xfrm>
+          <a:off x="0" y="0"/>
+          <a:ext cx="0" cy="0"/>
+          <a:chOff x="0" y="0"/>
+          <a:chExt cx="0" cy="0"/>
+        </a:xfrm>
+      </p:grpSpPr>
+      <p:pic>
+        <p:nvPicPr>
+          <p:cNvPr descr="bot_dayNight.jpeg" id="0" name="Picture 1"/>
+          <p:cNvPicPr>
+            <a:picLocks noGrp="1" noChangeAspect="1"/>
+          </p:cNvPicPr>
+          <p:nvPr/>
+        </p:nvPicPr>
+        <p:blipFill>
+          <a:blip r:embed="rId2"/>
+          <a:stretch>
+            <a:fillRect/>
+          </a:stretch>
+        </p:blipFill>
+        <p:spPr bwMode="auto">
+          <a:xfrm>
+            <a:off x="457200" y="2349500"/>
+            <a:ext cx="8229600" cy="3022600"/>
+          </a:xfrm>
+          <a:prstGeom prst="rect">
+            <a:avLst/>
+          </a:prstGeom>
+          <a:noFill/>
+          <a:ln w="9525">
+            <a:noFill/>
+            <a:headEnd/>
+            <a:tailEnd/>
+          </a:ln>
+        </p:spPr>
+      </p:pic>
+    </p:spTree>
+  </p:cSld>
+</p:sld>
+</file>
+
+<file path=ppt/slides/slide17.xml><?xml version="1.0" encoding="utf-8"?>
+<p:sld xmlns:a="http://schemas.openxmlformats.org/drawingml/2006/main" xmlns:r="http://schemas.openxmlformats.org/officeDocument/2006/relationships" xmlns:p="http://schemas.openxmlformats.org/presentationml/2006/main">
+  <p:cSld>
+    <p:spTree>
+      <p:nvGrpSpPr>
+        <p:cNvPr id="1" name=""/>
+        <p:cNvGrpSpPr/>
+        <p:nvPr/>
+      </p:nvGrpSpPr>
+      <p:grpSpPr>
+        <a:xfrm>
+          <a:off x="0" y="0"/>
+          <a:ext cx="0" cy="0"/>
+          <a:chOff x="0" y="0"/>
+          <a:chExt cx="0" cy="0"/>
+        </a:xfrm>
+      </p:grpSpPr>
+      <p:sp>
+        <p:nvSpPr>
+          <p:cNvPr id="2" name="Title 1"/>
+          <p:cNvSpPr>
+            <a:spLocks noGrp="1"/>
+          </p:cNvSpPr>
+          <p:nvPr>
+            <p:ph type="title"/>
+          </p:nvPr>
+        </p:nvSpPr>
+        <p:spPr/>
+        <p:txBody>
+          <a:bodyPr/>
+          <a:lstStyle/>
+          <a:p>
+            <a:pPr lvl="0" marL="0" indent="0">
+              <a:buNone/>
+            </a:pPr>
+            <a:r>
+              <a:rPr/>
+              <a:t>Botanical</a:t>
+            </a:r>
+            <a:r>
+              <a:rPr/>
+              <a:t> </a:t>
+            </a:r>
+            <a:r>
+              <a:rPr/>
+              <a:t>Heights</a:t>
+            </a:r>
+            <a:r>
+              <a:rPr/>
+              <a:t> </a:t>
+            </a:r>
+            <a:r>
+              <a:rPr/>
+              <a:t>Total</a:t>
+            </a:r>
+            <a:r>
+              <a:rPr/>
+              <a:t> </a:t>
+            </a:r>
+            <a:r>
+              <a:rPr/>
+              <a:t>Crime</a:t>
+            </a:r>
+          </a:p>
+        </p:txBody>
+      </p:sp>
+      <p:pic>
+        <p:nvPicPr>
+          <p:cNvPr descr="/Users/jesstevens/Documents/professional/wumcrc/safety-and-security/r-crime-mapping/results/bot/2019/bot_total_crimes.jpeg" id="0" name="Picture 1"/>
+          <p:cNvPicPr>
+            <a:picLocks noGrp="1" noChangeAspect="1"/>
+          </p:cNvPicPr>
+          <p:nvPr/>
+        </p:nvPicPr>
+        <p:blipFill>
+          <a:blip r:embed="rId2"/>
+          <a:stretch>
+            <a:fillRect/>
+          </a:stretch>
+        </p:blipFill>
+        <p:spPr bwMode="auto">
+          <a:xfrm>
+            <a:off x="1739900" y="1600200"/>
+            <a:ext cx="5651500" cy="4521200"/>
+          </a:xfrm>
+          <a:prstGeom prst="rect">
+            <a:avLst/>
+          </a:prstGeom>
+          <a:noFill/>
+          <a:ln w="9525">
+            <a:noFill/>
+            <a:headEnd/>
+            <a:tailEnd/>
+          </a:ln>
+        </p:spPr>
+      </p:pic>
+    </p:spTree>
+  </p:cSld>
+</p:sld>
+</file>
+
+<file path=ppt/slides/slide18.xml><?xml version="1.0" encoding="utf-8"?>
+<p:sld xmlns:a="http://schemas.openxmlformats.org/drawingml/2006/main" xmlns:r="http://schemas.openxmlformats.org/officeDocument/2006/relationships" xmlns:p="http://schemas.openxmlformats.org/presentationml/2006/main">
+  <p:cSld>
+    <p:spTree>
+      <p:nvGrpSpPr>
+        <p:cNvPr id="1" name=""/>
+        <p:cNvGrpSpPr/>
+        <p:nvPr/>
+      </p:nvGrpSpPr>
+      <p:grpSpPr>
+        <a:xfrm>
+          <a:off x="0" y="0"/>
+          <a:ext cx="0" cy="0"/>
+          <a:chOff x="0" y="0"/>
+          <a:chExt cx="0" cy="0"/>
+        </a:xfrm>
+      </p:grpSpPr>
+      <p:sp>
+        <p:nvSpPr>
+          <p:cNvPr id="2" name="Title 1"/>
+          <p:cNvSpPr>
+            <a:spLocks noGrp="1"/>
+          </p:cNvSpPr>
+          <p:nvPr>
+            <p:ph type="title"/>
+          </p:nvPr>
+        </p:nvSpPr>
+        <p:spPr/>
+        <p:txBody>
+          <a:bodyPr/>
+          <a:lstStyle/>
+          <a:p>
+            <a:pPr lvl="0" marL="0" indent="0">
+              <a:buNone/>
+            </a:pPr>
+            <a:r>
+              <a:rPr/>
+              <a:t>Botanical</a:t>
+            </a:r>
+            <a:r>
+              <a:rPr/>
+              <a:t> </a:t>
+            </a:r>
+            <a:r>
+              <a:rPr/>
+              <a:t>Heights</a:t>
+            </a:r>
+            <a:r>
+              <a:rPr/>
+              <a:t> </a:t>
+            </a:r>
+            <a:r>
+              <a:rPr/>
+              <a:t>Crime</a:t>
+            </a:r>
+            <a:r>
+              <a:rPr/>
+              <a:t> </a:t>
+            </a:r>
+            <a:r>
+              <a:rPr/>
+              <a:t>by</a:t>
+            </a:r>
+            <a:r>
+              <a:rPr/>
+              <a:t> </a:t>
+            </a:r>
+            <a:r>
+              <a:rPr/>
+              <a:t>Days</a:t>
+            </a:r>
+            <a:r>
+              <a:rPr/>
+              <a:t> </a:t>
+            </a:r>
+            <a:r>
+              <a:rPr/>
+              <a:t>of</a:t>
+            </a:r>
+            <a:r>
+              <a:rPr/>
+              <a:t> </a:t>
+            </a:r>
+            <a:r>
+              <a:rPr/>
+              <a:t>the</a:t>
+            </a:r>
+            <a:r>
+              <a:rPr/>
+              <a:t> </a:t>
+            </a:r>
+            <a:r>
+              <a:rPr/>
+              <a:t>Week</a:t>
+            </a:r>
+          </a:p>
+        </p:txBody>
+      </p:sp>
+      <p:pic>
+        <p:nvPicPr>
+          <p:cNvPr descr="/Users/jesstevens/Documents/professional/wumcrc/safety-and-security/r-crime-mapping/results/graphs/bot_crime_weekday.jpeg" id="0" name="Picture 1"/>
+          <p:cNvPicPr>
+            <a:picLocks noGrp="1" noChangeAspect="1"/>
+          </p:cNvPicPr>
+          <p:nvPr/>
+        </p:nvPicPr>
+        <p:blipFill>
+          <a:blip r:embed="rId2"/>
+          <a:stretch>
+            <a:fillRect/>
+          </a:stretch>
+        </p:blipFill>
+        <p:spPr bwMode="auto">
+          <a:xfrm>
+            <a:off x="1739900" y="1600200"/>
+            <a:ext cx="5651500" cy="4521200"/>
+          </a:xfrm>
+          <a:prstGeom prst="rect">
+            <a:avLst/>
+          </a:prstGeom>
+          <a:noFill/>
+          <a:ln w="9525">
+            <a:noFill/>
+            <a:headEnd/>
+            <a:tailEnd/>
+          </a:ln>
+        </p:spPr>
+      </p:pic>
+    </p:spTree>
+  </p:cSld>
+</p:sld>
+</file>
+
+<file path=ppt/slides/slide19.xml><?xml version="1.0" encoding="utf-8"?>
+<p:sld xmlns:a="http://schemas.openxmlformats.org/drawingml/2006/main" xmlns:r="http://schemas.openxmlformats.org/officeDocument/2006/relationships" xmlns:p="http://schemas.openxmlformats.org/presentationml/2006/main">
+  <p:cSld>
+    <p:spTree>
+      <p:nvGrpSpPr>
+        <p:cNvPr id="1" name=""/>
+        <p:cNvGrpSpPr/>
+        <p:nvPr/>
+      </p:nvGrpSpPr>
+      <p:grpSpPr>
+        <a:xfrm>
+          <a:off x="0" y="0"/>
+          <a:ext cx="0" cy="0"/>
+          <a:chOff x="0" y="0"/>
+          <a:chExt cx="0" cy="0"/>
+        </a:xfrm>
+      </p:grpSpPr>
+      <p:sp>
+        <p:nvSpPr>
+          <p:cNvPr id="2" name="Title 1"/>
+          <p:cNvSpPr>
+            <a:spLocks noGrp="1"/>
+          </p:cNvSpPr>
+          <p:nvPr>
+            <p:ph type="title"/>
+          </p:nvPr>
+        </p:nvSpPr>
+        <p:spPr/>
+        <p:txBody>
+          <a:bodyPr/>
+          <a:lstStyle/>
+          <a:p>
+            <a:pPr lvl="0" marL="0" indent="0">
+              <a:buNone/>
+            </a:pPr>
+            <a:r>
+              <a:rPr/>
+              <a:t>FPSE</a:t>
+            </a:r>
+            <a:r>
+              <a:rPr/>
+              <a:t> </a:t>
+            </a:r>
+            <a:r>
+              <a:rPr/>
+              <a:t>Larceny</a:t>
             </a:r>
           </a:p>
         </p:txBody>
@@ -3563,7 +4418,31 @@
             </a:r>
             <a:r>
               <a:rPr/>
-              <a:t>2019</a:t>
+              <a:t>2019:</a:t>
+            </a:r>
+            <a:r>
+              <a:rPr/>
+              <a:t> </a:t>
+            </a:r>
+            <a:r>
+              <a:rPr/>
+              <a:t>Forest</a:t>
+            </a:r>
+            <a:r>
+              <a:rPr/>
+              <a:t> </a:t>
+            </a:r>
+            <a:r>
+              <a:rPr/>
+              <a:t>Park</a:t>
+            </a:r>
+            <a:r>
+              <a:rPr/>
+              <a:t> </a:t>
+            </a:r>
+            <a:r>
+              <a:rPr/>
+              <a:t>Southeast</a:t>
             </a:r>
           </a:p>
         </p:txBody>
@@ -3674,12 +4553,12 @@
       </p:grpSpPr>
       <p:sp>
         <p:nvSpPr>
-          <p:cNvPr id="3" name="Content Placeholder 2"/>
-          <p:cNvSpPr>
-            <a:spLocks noGrp="1"/>
-          </p:cNvSpPr>
-          <p:nvPr>
-            <p:ph idx="1"/>
+          <p:cNvPr id="2" name="Title 1"/>
+          <p:cNvSpPr>
+            <a:spLocks noGrp="1"/>
+          </p:cNvSpPr>
+          <p:nvPr>
+            <p:ph type="title"/>
           </p:nvPr>
         </p:nvSpPr>
         <p:spPr/>
@@ -3690,21 +4569,340 @@
             <a:pPr lvl="0" marL="0" indent="0">
               <a:buNone/>
             </a:pPr>
-          </a:p>
+            <a:r>
+              <a:rPr/>
+              <a:t>Forest</a:t>
+            </a:r>
+            <a:r>
+              <a:rPr/>
+              <a:t> </a:t>
+            </a:r>
+            <a:r>
+              <a:rPr/>
+              <a:t>Park</a:t>
+            </a:r>
+            <a:r>
+              <a:rPr/>
+              <a:t> </a:t>
+            </a:r>
+            <a:r>
+              <a:rPr/>
+              <a:t>Southeast</a:t>
+            </a:r>
+            <a:r>
+              <a:rPr/>
+              <a:t> </a:t>
+            </a:r>
+            <a:r>
+              <a:rPr/>
+              <a:t>August</a:t>
+            </a:r>
+            <a:r>
+              <a:rPr/>
+              <a:t> </a:t>
+            </a:r>
+            <a:r>
+              <a:rPr/>
+              <a:t>2019</a:t>
+            </a:r>
+          </a:p>
+        </p:txBody>
+      </p:sp>
+      <p:pic>
+        <p:nvPicPr>
+          <p:cNvPr descr="fpse_crimCat.jpeg" id="0" name="Picture 1"/>
+          <p:cNvPicPr>
+            <a:picLocks noGrp="1" noChangeAspect="1"/>
+          </p:cNvPicPr>
+          <p:nvPr/>
+        </p:nvPicPr>
+        <p:blipFill>
+          <a:blip r:embed="rId2"/>
+          <a:stretch>
+            <a:fillRect/>
+          </a:stretch>
+        </p:blipFill>
+        <p:spPr bwMode="auto">
+          <a:xfrm>
+            <a:off x="1587500" y="1600200"/>
+            <a:ext cx="5969000" cy="4521200"/>
+          </a:xfrm>
+          <a:prstGeom prst="rect">
+            <a:avLst/>
+          </a:prstGeom>
+          <a:noFill/>
+          <a:ln w="9525">
+            <a:noFill/>
+            <a:headEnd/>
+            <a:tailEnd/>
+          </a:ln>
+        </p:spPr>
+      </p:pic>
+    </p:spTree>
+  </p:cSld>
+</p:sld>
+</file>
+
+<file path=ppt/slides/slide6.xml><?xml version="1.0" encoding="utf-8"?>
+<p:sld xmlns:a="http://schemas.openxmlformats.org/drawingml/2006/main" xmlns:r="http://schemas.openxmlformats.org/officeDocument/2006/relationships" xmlns:p="http://schemas.openxmlformats.org/presentationml/2006/main">
+  <p:cSld>
+    <p:spTree>
+      <p:nvGrpSpPr>
+        <p:cNvPr id="1" name=""/>
+        <p:cNvGrpSpPr/>
+        <p:nvPr/>
+      </p:nvGrpSpPr>
+      <p:grpSpPr>
+        <a:xfrm>
+          <a:off x="0" y="0"/>
+          <a:ext cx="0" cy="0"/>
+          <a:chOff x="0" y="0"/>
+          <a:chExt cx="0" cy="0"/>
+        </a:xfrm>
+      </p:grpSpPr>
+      <p:pic>
+        <p:nvPicPr>
+          <p:cNvPr descr="fpse_weekDay.jpeg" id="0" name="Picture 1"/>
+          <p:cNvPicPr>
+            <a:picLocks noGrp="1" noChangeAspect="1"/>
+          </p:cNvPicPr>
+          <p:nvPr/>
+        </p:nvPicPr>
+        <p:blipFill>
+          <a:blip r:embed="rId2"/>
+          <a:stretch>
+            <a:fillRect/>
+          </a:stretch>
+        </p:blipFill>
+        <p:spPr bwMode="auto">
+          <a:xfrm>
+            <a:off x="2552700" y="1600200"/>
+            <a:ext cx="4038600" cy="4521200"/>
+          </a:xfrm>
+          <a:prstGeom prst="rect">
+            <a:avLst/>
+          </a:prstGeom>
+          <a:noFill/>
+          <a:ln w="9525">
+            <a:noFill/>
+            <a:headEnd/>
+            <a:tailEnd/>
+          </a:ln>
+        </p:spPr>
+      </p:pic>
+    </p:spTree>
+  </p:cSld>
+</p:sld>
+</file>
+
+<file path=ppt/slides/slide7.xml><?xml version="1.0" encoding="utf-8"?>
+<p:sld xmlns:a="http://schemas.openxmlformats.org/drawingml/2006/main" xmlns:r="http://schemas.openxmlformats.org/officeDocument/2006/relationships" xmlns:p="http://schemas.openxmlformats.org/presentationml/2006/main">
+  <p:cSld>
+    <p:spTree>
+      <p:nvGrpSpPr>
+        <p:cNvPr id="1" name=""/>
+        <p:cNvGrpSpPr/>
+        <p:nvPr/>
+      </p:nvGrpSpPr>
+      <p:grpSpPr>
+        <a:xfrm>
+          <a:off x="0" y="0"/>
+          <a:ext cx="0" cy="0"/>
+          <a:chOff x="0" y="0"/>
+          <a:chExt cx="0" cy="0"/>
+        </a:xfrm>
+      </p:grpSpPr>
+      <p:pic>
+        <p:nvPicPr>
+          <p:cNvPr descr="fpse_violent.jpeg" id="0" name="Picture 1"/>
+          <p:cNvPicPr>
+            <a:picLocks noGrp="1" noChangeAspect="1"/>
+          </p:cNvPicPr>
+          <p:nvPr/>
+        </p:nvPicPr>
+        <p:blipFill>
+          <a:blip r:embed="rId2"/>
+          <a:stretch>
+            <a:fillRect/>
+          </a:stretch>
+        </p:blipFill>
+        <p:spPr bwMode="auto">
+          <a:xfrm>
+            <a:off x="457200" y="2019300"/>
+            <a:ext cx="8229600" cy="3683000"/>
+          </a:xfrm>
+          <a:prstGeom prst="rect">
+            <a:avLst/>
+          </a:prstGeom>
+          <a:noFill/>
+          <a:ln w="9525">
+            <a:noFill/>
+            <a:headEnd/>
+            <a:tailEnd/>
+          </a:ln>
+        </p:spPr>
+      </p:pic>
+    </p:spTree>
+  </p:cSld>
+</p:sld>
+</file>
+
+<file path=ppt/slides/slide8.xml><?xml version="1.0" encoding="utf-8"?>
+<p:sld xmlns:a="http://schemas.openxmlformats.org/drawingml/2006/main" xmlns:r="http://schemas.openxmlformats.org/officeDocument/2006/relationships" xmlns:p="http://schemas.openxmlformats.org/presentationml/2006/main">
+  <p:cSld>
+    <p:spTree>
+      <p:nvGrpSpPr>
+        <p:cNvPr id="1" name=""/>
+        <p:cNvGrpSpPr/>
+        <p:nvPr/>
+      </p:nvGrpSpPr>
+      <p:grpSpPr>
+        <a:xfrm>
+          <a:off x="0" y="0"/>
+          <a:ext cx="0" cy="0"/>
+          <a:chOff x="0" y="0"/>
+          <a:chExt cx="0" cy="0"/>
+        </a:xfrm>
+      </p:grpSpPr>
+      <p:pic>
+        <p:nvPicPr>
+          <p:cNvPr descr="fpse_dayNight.jpeg" id="0" name="Picture 1"/>
+          <p:cNvPicPr>
+            <a:picLocks noGrp="1" noChangeAspect="1"/>
+          </p:cNvPicPr>
+          <p:nvPr/>
+        </p:nvPicPr>
+        <p:blipFill>
+          <a:blip r:embed="rId2"/>
+          <a:stretch>
+            <a:fillRect/>
+          </a:stretch>
+        </p:blipFill>
+        <p:spPr bwMode="auto">
+          <a:xfrm>
+            <a:off x="584200" y="1600200"/>
+            <a:ext cx="7975600" cy="4521200"/>
+          </a:xfrm>
+          <a:prstGeom prst="rect">
+            <a:avLst/>
+          </a:prstGeom>
+          <a:noFill/>
+          <a:ln w="9525">
+            <a:noFill/>
+            <a:headEnd/>
+            <a:tailEnd/>
+          </a:ln>
+        </p:spPr>
+      </p:pic>
+    </p:spTree>
+  </p:cSld>
+</p:sld>
+</file>
+
+<file path=ppt/slides/slide9.xml><?xml version="1.0" encoding="utf-8"?>
+<p:sld xmlns:a="http://schemas.openxmlformats.org/drawingml/2006/main" xmlns:r="http://schemas.openxmlformats.org/officeDocument/2006/relationships" xmlns:p="http://schemas.openxmlformats.org/presentationml/2006/main">
+  <p:cSld>
+    <p:spTree>
+      <p:nvGrpSpPr>
+        <p:cNvPr id="1" name=""/>
+        <p:cNvGrpSpPr/>
+        <p:nvPr/>
+      </p:nvGrpSpPr>
+      <p:grpSpPr>
+        <a:xfrm>
+          <a:off x="0" y="0"/>
+          <a:ext cx="0" cy="0"/>
+          <a:chOff x="0" y="0"/>
+          <a:chExt cx="0" cy="0"/>
+        </a:xfrm>
+      </p:grpSpPr>
+      <p:sp>
+        <p:nvSpPr>
+          <p:cNvPr id="2" name="Title 1"/>
+          <p:cNvSpPr>
+            <a:spLocks noGrp="1"/>
+          </p:cNvSpPr>
+          <p:nvPr>
+            <p:ph type="title"/>
+          </p:nvPr>
+        </p:nvSpPr>
+        <p:spPr/>
+        <p:txBody>
+          <a:bodyPr/>
+          <a:lstStyle/>
           <a:p>
             <a:pPr lvl="0" marL="0" indent="0">
-              <a:spcBef>
-                <a:spcPts val="3000"/>
-              </a:spcBef>
               <a:buNone/>
             </a:pPr>
             <a:r>
-              <a:rPr b="1"/>
-              <a:t>Forest Park Southeast 2019</a:t>
-            </a:r>
-          </a:p>
-        </p:txBody>
-      </p:sp>
+              <a:rPr/>
+              <a:t>Forest</a:t>
+            </a:r>
+            <a:r>
+              <a:rPr/>
+              <a:t> </a:t>
+            </a:r>
+            <a:r>
+              <a:rPr/>
+              <a:t>Park</a:t>
+            </a:r>
+            <a:r>
+              <a:rPr/>
+              <a:t> </a:t>
+            </a:r>
+            <a:r>
+              <a:rPr/>
+              <a:t>Southeast</a:t>
+            </a:r>
+            <a:r>
+              <a:rPr/>
+              <a:t> </a:t>
+            </a:r>
+            <a:r>
+              <a:rPr/>
+              <a:t>Total</a:t>
+            </a:r>
+            <a:r>
+              <a:rPr/>
+              <a:t> </a:t>
+            </a:r>
+            <a:r>
+              <a:rPr/>
+              <a:t>Crime</a:t>
+            </a:r>
+          </a:p>
+        </p:txBody>
+      </p:sp>
+      <p:pic>
+        <p:nvPicPr>
+          <p:cNvPr descr="/Users/jesstevens/Documents/professional/wumcrc/safety-and-security/r-crime-mapping/results/fpse/2019/august/fpse_total_crimes.jpeg" id="0" name="Picture 1"/>
+          <p:cNvPicPr>
+            <a:picLocks noGrp="1" noChangeAspect="1"/>
+          </p:cNvPicPr>
+          <p:nvPr/>
+        </p:nvPicPr>
+        <p:blipFill>
+          <a:blip r:embed="rId2"/>
+          <a:stretch>
+            <a:fillRect/>
+          </a:stretch>
+        </p:blipFill>
+        <p:spPr bwMode="auto">
+          <a:xfrm>
+            <a:off x="1714500" y="1600200"/>
+            <a:ext cx="5715000" cy="4521200"/>
+          </a:xfrm>
+          <a:prstGeom prst="rect">
+            <a:avLst/>
+          </a:prstGeom>
+          <a:noFill/>
+          <a:ln w="9525">
+            <a:noFill/>
+            <a:headEnd/>
+            <a:tailEnd/>
+          </a:ln>
+        </p:spPr>
+      </p:pic>
     </p:spTree>
   </p:cSld>
 </p:sld>

</xml_diff>

<commit_message>
added shapefiles for med campus crimes in 2018 and 2019
</commit_message>
<xml_diff>
--- a/src/notebooks/fpse-presentation.pptx
+++ b/src/notebooks/fpse-presentation.pptx
@@ -24,6 +24,16 @@
     <p:sldId id="272" r:id="rId18"/>
     <p:sldId id="273" r:id="rId19"/>
     <p:sldId id="274" r:id="rId20"/>
+    <p:sldId id="275" r:id="rId21"/>
+    <p:sldId id="276" r:id="rId22"/>
+    <p:sldId id="277" r:id="rId23"/>
+    <p:sldId id="278" r:id="rId24"/>
+    <p:sldId id="279" r:id="rId25"/>
+    <p:sldId id="280" r:id="rId26"/>
+    <p:sldId id="281" r:id="rId27"/>
+    <p:sldId id="282" r:id="rId28"/>
+    <p:sldId id="283" r:id="rId29"/>
+    <p:sldId id="284" r:id="rId30"/>
   </p:sldIdLst>
   <p:sldSz cx="9144000" cy="6858000" type="screen4x3"/>
   <p:notesSz cx="6858000" cy="9144000"/>
@@ -4156,15 +4166,31 @@
             </a:pPr>
             <a:r>
               <a:rPr/>
-              <a:t>FPSE</a:t>
-            </a:r>
-            <a:r>
-              <a:rPr/>
-              <a:t> </a:t>
-            </a:r>
-            <a:r>
-              <a:rPr/>
-              <a:t>Larceny</a:t>
+              <a:t>District</a:t>
+            </a:r>
+            <a:r>
+              <a:rPr/>
+              <a:t> </a:t>
+            </a:r>
+            <a:r>
+              <a:rPr/>
+              <a:t>2</a:t>
+            </a:r>
+            <a:r>
+              <a:rPr/>
+              <a:t> </a:t>
+            </a:r>
+            <a:r>
+              <a:rPr/>
+              <a:t>Crime</a:t>
+            </a:r>
+            <a:r>
+              <a:rPr/>
+              <a:t> </a:t>
+            </a:r>
+            <a:r>
+              <a:rPr/>
+              <a:t>Rates</a:t>
             </a:r>
           </a:p>
         </p:txBody>
@@ -4348,6 +4374,965 @@
                 <a:latin typeface="Courier"/>
               </a:rPr>
               <a:t>## [1] "-20.6% change compared to this time in 2018 (34 crimes against persons)"</a:t>
+            </a:r>
+          </a:p>
+        </p:txBody>
+      </p:sp>
+    </p:spTree>
+  </p:cSld>
+</p:sld>
+</file>
+
+<file path=ppt/slides/slide20.xml><?xml version="1.0" encoding="utf-8"?>
+<p:sld xmlns:a="http://schemas.openxmlformats.org/drawingml/2006/main" xmlns:r="http://schemas.openxmlformats.org/officeDocument/2006/relationships" xmlns:p="http://schemas.openxmlformats.org/presentationml/2006/main">
+  <p:cSld>
+    <p:spTree>
+      <p:nvGrpSpPr>
+        <p:cNvPr id="1" name=""/>
+        <p:cNvGrpSpPr/>
+        <p:nvPr/>
+      </p:nvGrpSpPr>
+      <p:grpSpPr>
+        <a:xfrm>
+          <a:off x="0" y="0"/>
+          <a:ext cx="0" cy="0"/>
+          <a:chOff x="0" y="0"/>
+          <a:chExt cx="0" cy="0"/>
+        </a:xfrm>
+      </p:grpSpPr>
+      <p:sp>
+        <p:nvSpPr>
+          <p:cNvPr id="2" name="Title 1"/>
+          <p:cNvSpPr>
+            <a:spLocks noGrp="1"/>
+          </p:cNvSpPr>
+          <p:nvPr>
+            <p:ph type="title"/>
+          </p:nvPr>
+        </p:nvSpPr>
+        <p:spPr/>
+        <p:txBody>
+          <a:bodyPr/>
+          <a:lstStyle/>
+          <a:p>
+            <a:pPr lvl="0" marL="0" indent="0">
+              <a:buNone/>
+            </a:pPr>
+            <a:r>
+              <a:rPr/>
+              <a:t>District</a:t>
+            </a:r>
+            <a:r>
+              <a:rPr/>
+              <a:t> </a:t>
+            </a:r>
+            <a:r>
+              <a:rPr/>
+              <a:t>2</a:t>
+            </a:r>
+            <a:r>
+              <a:rPr/>
+              <a:t> </a:t>
+            </a:r>
+            <a:r>
+              <a:rPr/>
+              <a:t>Density</a:t>
+            </a:r>
+            <a:r>
+              <a:rPr/>
+              <a:t> </a:t>
+            </a:r>
+            <a:r>
+              <a:rPr/>
+              <a:t>Map</a:t>
+            </a:r>
+            <a:r>
+              <a:rPr/>
+              <a:t> </a:t>
+            </a:r>
+            <a:r>
+              <a:rPr/>
+              <a:t>Explanation</a:t>
+            </a:r>
+          </a:p>
+        </p:txBody>
+      </p:sp>
+      <p:sp>
+        <p:nvSpPr>
+          <p:cNvPr id="3" name="Content Placeholder 2"/>
+          <p:cNvSpPr>
+            <a:spLocks noGrp="1"/>
+          </p:cNvSpPr>
+          <p:nvPr>
+            <p:ph idx="1"/>
+          </p:nvPr>
+        </p:nvSpPr>
+        <p:spPr/>
+        <p:txBody>
+          <a:bodyPr/>
+          <a:lstStyle/>
+          <a:p>
+            <a:pPr lvl="0" marL="0" indent="0">
+              <a:buNone/>
+            </a:pPr>
+            <a:r>
+              <a:rPr/>
+              <a:t>There are 23 neighborhoods in District 2. The South Hampton neighborhood is split between District 2 and District 1.</a:t>
+            </a:r>
+          </a:p>
+          <a:p>
+            <a:pPr lvl="0" marL="1270000" indent="0">
+              <a:buNone/>
+            </a:pPr>
+            <a:r>
+              <a:rPr sz="1800">
+                <a:latin typeface="Courier"/>
+              </a:rPr>
+              <a:t>## [1] "The minimum number of crimes in one neighborhood was 1 (Wydown Skinker)"</a:t>
+            </a:r>
+          </a:p>
+          <a:p>
+            <a:pPr lvl="0" marL="1270000" indent="0">
+              <a:buNone/>
+            </a:pPr>
+            <a:r>
+              <a:rPr sz="1800">
+                <a:latin typeface="Courier"/>
+              </a:rPr>
+              <a:t>## [1] "The maximum number of crimes in one neighborhood was 72 (Tower Grove South)"</a:t>
+            </a:r>
+          </a:p>
+          <a:p>
+            <a:pPr lvl="0" marL="1270000" indent="0">
+              <a:buNone/>
+            </a:pPr>
+            <a:r>
+              <a:rPr sz="1800">
+                <a:latin typeface="Courier"/>
+              </a:rPr>
+              <a:t>## [1] "The mean number of crimes in one neighborhood was 15.95"</a:t>
+            </a:r>
+          </a:p>
+          <a:p>
+            <a:pPr lvl="0" marL="1270000" indent="0">
+              <a:buNone/>
+            </a:pPr>
+            <a:r>
+              <a:rPr sz="1800">
+                <a:latin typeface="Courier"/>
+              </a:rPr>
+              <a:t>## [1] "The minimum rate of crimes in one neighborhood was 0.95 (Wydown Skinker)"</a:t>
+            </a:r>
+          </a:p>
+          <a:p>
+            <a:pPr lvl="0" marL="1270000" indent="0">
+              <a:buNone/>
+            </a:pPr>
+            <a:r>
+              <a:rPr sz="1800">
+                <a:latin typeface="Courier"/>
+              </a:rPr>
+              <a:t>## [1] "The maximum rate of crimes in one neighborhood was 12.9 (Cheltenham)"</a:t>
+            </a:r>
+          </a:p>
+          <a:p>
+            <a:pPr lvl="0" marL="1270000" indent="0">
+              <a:buNone/>
+            </a:pPr>
+            <a:r>
+              <a:rPr sz="1800">
+                <a:latin typeface="Courier"/>
+              </a:rPr>
+              <a:t>## [1] "The mean rate of crimes in one neighborhood was 5.28"</a:t>
+            </a:r>
+          </a:p>
+        </p:txBody>
+      </p:sp>
+    </p:spTree>
+  </p:cSld>
+</p:sld>
+</file>
+
+<file path=ppt/slides/slide21.xml><?xml version="1.0" encoding="utf-8"?>
+<p:sld xmlns:a="http://schemas.openxmlformats.org/drawingml/2006/main" xmlns:r="http://schemas.openxmlformats.org/officeDocument/2006/relationships" xmlns:p="http://schemas.openxmlformats.org/presentationml/2006/main">
+  <p:cSld>
+    <p:spTree>
+      <p:nvGrpSpPr>
+        <p:cNvPr id="1" name=""/>
+        <p:cNvGrpSpPr/>
+        <p:nvPr/>
+      </p:nvGrpSpPr>
+      <p:grpSpPr>
+        <a:xfrm>
+          <a:off x="0" y="0"/>
+          <a:ext cx="0" cy="0"/>
+          <a:chOff x="0" y="0"/>
+          <a:chExt cx="0" cy="0"/>
+        </a:xfrm>
+      </p:grpSpPr>
+      <p:sp>
+        <p:nvSpPr>
+          <p:cNvPr id="2" name="Title 1"/>
+          <p:cNvSpPr>
+            <a:spLocks noGrp="1"/>
+          </p:cNvSpPr>
+          <p:nvPr>
+            <p:ph type="title"/>
+          </p:nvPr>
+        </p:nvSpPr>
+        <p:spPr/>
+        <p:txBody>
+          <a:bodyPr/>
+          <a:lstStyle/>
+          <a:p>
+            <a:pPr lvl="0" marL="0" indent="0">
+              <a:buNone/>
+            </a:pPr>
+            <a:r>
+              <a:rPr/>
+              <a:t>Summary</a:t>
+            </a:r>
+            <a:r>
+              <a:rPr/>
+              <a:t> </a:t>
+            </a:r>
+            <a:r>
+              <a:rPr/>
+              <a:t>Notes:</a:t>
+            </a:r>
+            <a:r>
+              <a:rPr/>
+              <a:t> </a:t>
+            </a:r>
+            <a:r>
+              <a:rPr/>
+              <a:t>Central</a:t>
+            </a:r>
+            <a:r>
+              <a:rPr/>
+              <a:t> </a:t>
+            </a:r>
+            <a:r>
+              <a:rPr/>
+              <a:t>West</a:t>
+            </a:r>
+            <a:r>
+              <a:rPr/>
+              <a:t> </a:t>
+            </a:r>
+            <a:r>
+              <a:rPr/>
+              <a:t>End</a:t>
+            </a:r>
+          </a:p>
+        </p:txBody>
+      </p:sp>
+      <p:sp>
+        <p:nvSpPr>
+          <p:cNvPr id="3" name="Content Placeholder 2"/>
+          <p:cNvSpPr>
+            <a:spLocks noGrp="1"/>
+          </p:cNvSpPr>
+          <p:nvPr>
+            <p:ph idx="1"/>
+          </p:nvPr>
+        </p:nvSpPr>
+        <p:spPr/>
+        <p:txBody>
+          <a:bodyPr/>
+          <a:lstStyle/>
+          <a:p>
+            <a:pPr lvl="0" marL="1270000" indent="0">
+              <a:buNone/>
+            </a:pPr>
+            <a:r>
+              <a:rPr sz="1800">
+                <a:latin typeface="Courier"/>
+              </a:rPr>
+              <a:t>## [1] "121 total crimes in August 2019"</a:t>
+            </a:r>
+          </a:p>
+          <a:p>
+            <a:pPr lvl="0" marL="1270000" indent="0">
+              <a:buNone/>
+            </a:pPr>
+            <a:r>
+              <a:rPr sz="1800">
+                <a:latin typeface="Courier"/>
+              </a:rPr>
+              <a:t>## [1] "0% change compared to August 2018 (121 total crimes)"</a:t>
+            </a:r>
+          </a:p>
+          <a:p>
+            <a:pPr lvl="0" marL="1270000" indent="0">
+              <a:buNone/>
+            </a:pPr>
+            <a:r>
+              <a:rPr sz="1800">
+                <a:latin typeface="Courier"/>
+              </a:rPr>
+              <a:t>## [1] "18 crime(s) against persons in August 2019"</a:t>
+            </a:r>
+          </a:p>
+          <a:p>
+            <a:pPr lvl="0" marL="1270000" indent="0">
+              <a:buNone/>
+            </a:pPr>
+            <a:r>
+              <a:rPr sz="1800">
+                <a:latin typeface="Courier"/>
+              </a:rPr>
+              <a:t>## [1] "38.5% change compared to August 2018 (13 crimes against persons)"</a:t>
+            </a:r>
+          </a:p>
+          <a:p>
+            <a:pPr lvl="0" marL="1270000" indent="0">
+              <a:buNone/>
+            </a:pPr>
+            <a:r>
+              <a:rPr sz="1800">
+                <a:latin typeface="Courier"/>
+              </a:rPr>
+              <a:t>## [1] "770 total crimes in 2019"</a:t>
+            </a:r>
+          </a:p>
+          <a:p>
+            <a:pPr lvl="0" marL="1270000" indent="0">
+              <a:buNone/>
+            </a:pPr>
+            <a:r>
+              <a:rPr sz="1800">
+                <a:latin typeface="Courier"/>
+              </a:rPr>
+              <a:t>## [1] "-8.33% change compared to this time in 2018 (840 total crimes)"</a:t>
+            </a:r>
+          </a:p>
+          <a:p>
+            <a:pPr lvl="0" marL="1270000" indent="0">
+              <a:buNone/>
+            </a:pPr>
+            <a:r>
+              <a:rPr sz="1800">
+                <a:latin typeface="Courier"/>
+              </a:rPr>
+              <a:t>## [1] "101 crime(s) against persons in 2019"</a:t>
+            </a:r>
+          </a:p>
+          <a:p>
+            <a:pPr lvl="0" marL="1270000" indent="0">
+              <a:buNone/>
+            </a:pPr>
+            <a:r>
+              <a:rPr sz="1800">
+                <a:latin typeface="Courier"/>
+              </a:rPr>
+              <a:t>## [1] "17.4% change compared to this time in 2018 (86 crimes against persons)"</a:t>
+            </a:r>
+          </a:p>
+        </p:txBody>
+      </p:sp>
+    </p:spTree>
+  </p:cSld>
+</p:sld>
+</file>
+
+<file path=ppt/slides/slide22.xml><?xml version="1.0" encoding="utf-8"?>
+<p:sld xmlns:a="http://schemas.openxmlformats.org/drawingml/2006/main" xmlns:r="http://schemas.openxmlformats.org/officeDocument/2006/relationships" xmlns:p="http://schemas.openxmlformats.org/presentationml/2006/main">
+  <p:cSld>
+    <p:spTree>
+      <p:nvGrpSpPr>
+        <p:cNvPr id="1" name=""/>
+        <p:cNvGrpSpPr/>
+        <p:nvPr/>
+      </p:nvGrpSpPr>
+      <p:grpSpPr>
+        <a:xfrm>
+          <a:off x="0" y="0"/>
+          <a:ext cx="0" cy="0"/>
+          <a:chOff x="0" y="0"/>
+          <a:chExt cx="0" cy="0"/>
+        </a:xfrm>
+      </p:grpSpPr>
+      <p:sp>
+        <p:nvSpPr>
+          <p:cNvPr id="2" name="Title 1"/>
+          <p:cNvSpPr>
+            <a:spLocks noGrp="1"/>
+          </p:cNvSpPr>
+          <p:nvPr>
+            <p:ph type="title"/>
+          </p:nvPr>
+        </p:nvSpPr>
+        <p:spPr/>
+        <p:txBody>
+          <a:bodyPr/>
+          <a:lstStyle/>
+          <a:p>
+            <a:pPr lvl="0" marL="0" indent="0">
+              <a:buNone/>
+            </a:pPr>
+            <a:r>
+              <a:rPr/>
+              <a:t>Comparing</a:t>
+            </a:r>
+            <a:r>
+              <a:rPr/>
+              <a:t> </a:t>
+            </a:r>
+            <a:r>
+              <a:rPr/>
+              <a:t>2018</a:t>
+            </a:r>
+            <a:r>
+              <a:rPr/>
+              <a:t> </a:t>
+            </a:r>
+            <a:r>
+              <a:rPr/>
+              <a:t>to</a:t>
+            </a:r>
+            <a:r>
+              <a:rPr/>
+              <a:t> </a:t>
+            </a:r>
+            <a:r>
+              <a:rPr/>
+              <a:t>2019:</a:t>
+            </a:r>
+            <a:r>
+              <a:rPr/>
+              <a:t> </a:t>
+            </a:r>
+            <a:r>
+              <a:rPr/>
+              <a:t>Central</a:t>
+            </a:r>
+            <a:r>
+              <a:rPr/>
+              <a:t> </a:t>
+            </a:r>
+            <a:r>
+              <a:rPr/>
+              <a:t>West</a:t>
+            </a:r>
+            <a:r>
+              <a:rPr/>
+              <a:t> </a:t>
+            </a:r>
+            <a:r>
+              <a:rPr/>
+              <a:t>End</a:t>
+            </a:r>
+          </a:p>
+        </p:txBody>
+      </p:sp>
+      <p:pic>
+        <p:nvPicPr>
+          <p:cNvPr descr="cwe_2018.jpeg" id="0" name="Picture 1"/>
+          <p:cNvPicPr>
+            <a:picLocks noGrp="1" noChangeAspect="1"/>
+          </p:cNvPicPr>
+          <p:nvPr/>
+        </p:nvPicPr>
+        <p:blipFill>
+          <a:blip r:embed="rId2"/>
+          <a:stretch>
+            <a:fillRect/>
+          </a:stretch>
+        </p:blipFill>
+        <p:spPr bwMode="auto">
+          <a:xfrm>
+            <a:off x="457200" y="2692400"/>
+            <a:ext cx="8229600" cy="2336800"/>
+          </a:xfrm>
+          <a:prstGeom prst="rect">
+            <a:avLst/>
+          </a:prstGeom>
+          <a:noFill/>
+          <a:ln w="9525">
+            <a:noFill/>
+            <a:headEnd/>
+            <a:tailEnd/>
+          </a:ln>
+        </p:spPr>
+      </p:pic>
+    </p:spTree>
+  </p:cSld>
+</p:sld>
+</file>
+
+<file path=ppt/slides/slide23.xml><?xml version="1.0" encoding="utf-8"?>
+<p:sld xmlns:a="http://schemas.openxmlformats.org/drawingml/2006/main" xmlns:r="http://schemas.openxmlformats.org/officeDocument/2006/relationships" xmlns:p="http://schemas.openxmlformats.org/presentationml/2006/main">
+  <p:cSld>
+    <p:spTree>
+      <p:nvGrpSpPr>
+        <p:cNvPr id="1" name=""/>
+        <p:cNvGrpSpPr/>
+        <p:nvPr/>
+      </p:nvGrpSpPr>
+      <p:grpSpPr>
+        <a:xfrm>
+          <a:off x="0" y="0"/>
+          <a:ext cx="0" cy="0"/>
+          <a:chOff x="0" y="0"/>
+          <a:chExt cx="0" cy="0"/>
+        </a:xfrm>
+      </p:grpSpPr>
+      <p:pic>
+        <p:nvPicPr>
+          <p:cNvPr descr="cwe_2019.jpeg" id="0" name="Picture 1"/>
+          <p:cNvPicPr>
+            <a:picLocks noGrp="1" noChangeAspect="1"/>
+          </p:cNvPicPr>
+          <p:nvPr/>
+        </p:nvPicPr>
+        <p:blipFill>
+          <a:blip r:embed="rId2"/>
+          <a:stretch>
+            <a:fillRect/>
+          </a:stretch>
+        </p:blipFill>
+        <p:spPr bwMode="auto">
+          <a:xfrm>
+            <a:off x="457200" y="2070100"/>
+            <a:ext cx="8229600" cy="3581400"/>
+          </a:xfrm>
+          <a:prstGeom prst="rect">
+            <a:avLst/>
+          </a:prstGeom>
+          <a:noFill/>
+          <a:ln w="9525">
+            <a:noFill/>
+            <a:headEnd/>
+            <a:tailEnd/>
+          </a:ln>
+        </p:spPr>
+      </p:pic>
+    </p:spTree>
+  </p:cSld>
+</p:sld>
+</file>
+
+<file path=ppt/slides/slide24.xml><?xml version="1.0" encoding="utf-8"?>
+<p:sld xmlns:a="http://schemas.openxmlformats.org/drawingml/2006/main" xmlns:r="http://schemas.openxmlformats.org/officeDocument/2006/relationships" xmlns:p="http://schemas.openxmlformats.org/presentationml/2006/main">
+  <p:cSld>
+    <p:spTree>
+      <p:nvGrpSpPr>
+        <p:cNvPr id="1" name=""/>
+        <p:cNvGrpSpPr/>
+        <p:nvPr/>
+      </p:nvGrpSpPr>
+      <p:grpSpPr>
+        <a:xfrm>
+          <a:off x="0" y="0"/>
+          <a:ext cx="0" cy="0"/>
+          <a:chOff x="0" y="0"/>
+          <a:chExt cx="0" cy="0"/>
+        </a:xfrm>
+      </p:grpSpPr>
+      <p:sp>
+        <p:nvSpPr>
+          <p:cNvPr id="2" name="Title 1"/>
+          <p:cNvSpPr>
+            <a:spLocks noGrp="1"/>
+          </p:cNvSpPr>
+          <p:nvPr>
+            <p:ph type="title"/>
+          </p:nvPr>
+        </p:nvSpPr>
+        <p:spPr/>
+        <p:txBody>
+          <a:bodyPr/>
+          <a:lstStyle/>
+          <a:p>
+            <a:pPr lvl="0" marL="0" indent="0">
+              <a:buNone/>
+            </a:pPr>
+            <a:r>
+              <a:rPr/>
+              <a:t>Central</a:t>
+            </a:r>
+            <a:r>
+              <a:rPr/>
+              <a:t> </a:t>
+            </a:r>
+            <a:r>
+              <a:rPr/>
+              <a:t>West</a:t>
+            </a:r>
+            <a:r>
+              <a:rPr/>
+              <a:t> </a:t>
+            </a:r>
+            <a:r>
+              <a:rPr/>
+              <a:t>End:</a:t>
+            </a:r>
+            <a:r>
+              <a:rPr/>
+              <a:t> </a:t>
+            </a:r>
+            <a:r>
+              <a:rPr/>
+              <a:t>August</a:t>
+            </a:r>
+            <a:r>
+              <a:rPr/>
+              <a:t> </a:t>
+            </a:r>
+            <a:r>
+              <a:rPr/>
+              <a:t>2019</a:t>
+            </a:r>
+          </a:p>
+        </p:txBody>
+      </p:sp>
+      <p:pic>
+        <p:nvPicPr>
+          <p:cNvPr descr="cwe_crimCat.jpeg" id="0" name="Picture 1"/>
+          <p:cNvPicPr>
+            <a:picLocks noGrp="1" noChangeAspect="1"/>
+          </p:cNvPicPr>
+          <p:nvPr/>
+        </p:nvPicPr>
+        <p:blipFill>
+          <a:blip r:embed="rId2"/>
+          <a:stretch>
+            <a:fillRect/>
+          </a:stretch>
+        </p:blipFill>
+        <p:spPr bwMode="auto">
+          <a:xfrm>
+            <a:off x="1917700" y="1600200"/>
+            <a:ext cx="5295900" cy="4521200"/>
+          </a:xfrm>
+          <a:prstGeom prst="rect">
+            <a:avLst/>
+          </a:prstGeom>
+          <a:noFill/>
+          <a:ln w="9525">
+            <a:noFill/>
+            <a:headEnd/>
+            <a:tailEnd/>
+          </a:ln>
+        </p:spPr>
+      </p:pic>
+    </p:spTree>
+  </p:cSld>
+</p:sld>
+</file>
+
+<file path=ppt/slides/slide25.xml><?xml version="1.0" encoding="utf-8"?>
+<p:sld xmlns:a="http://schemas.openxmlformats.org/drawingml/2006/main" xmlns:r="http://schemas.openxmlformats.org/officeDocument/2006/relationships" xmlns:p="http://schemas.openxmlformats.org/presentationml/2006/main">
+  <p:cSld>
+    <p:spTree>
+      <p:nvGrpSpPr>
+        <p:cNvPr id="1" name=""/>
+        <p:cNvGrpSpPr/>
+        <p:nvPr/>
+      </p:nvGrpSpPr>
+      <p:grpSpPr>
+        <a:xfrm>
+          <a:off x="0" y="0"/>
+          <a:ext cx="0" cy="0"/>
+          <a:chOff x="0" y="0"/>
+          <a:chExt cx="0" cy="0"/>
+        </a:xfrm>
+      </p:grpSpPr>
+      <p:pic>
+        <p:nvPicPr>
+          <p:cNvPr descr="cwe_weekDay.jpeg" id="0" name="Picture 1"/>
+          <p:cNvPicPr>
+            <a:picLocks noGrp="1" noChangeAspect="1"/>
+          </p:cNvPicPr>
+          <p:nvPr/>
+        </p:nvPicPr>
+        <p:blipFill>
+          <a:blip r:embed="rId2"/>
+          <a:stretch>
+            <a:fillRect/>
+          </a:stretch>
+        </p:blipFill>
+        <p:spPr bwMode="auto">
+          <a:xfrm>
+            <a:off x="2552700" y="1600200"/>
+            <a:ext cx="4038600" cy="4521200"/>
+          </a:xfrm>
+          <a:prstGeom prst="rect">
+            <a:avLst/>
+          </a:prstGeom>
+          <a:noFill/>
+          <a:ln w="9525">
+            <a:noFill/>
+            <a:headEnd/>
+            <a:tailEnd/>
+          </a:ln>
+        </p:spPr>
+      </p:pic>
+    </p:spTree>
+  </p:cSld>
+</p:sld>
+</file>
+
+<file path=ppt/slides/slide26.xml><?xml version="1.0" encoding="utf-8"?>
+<p:sld xmlns:a="http://schemas.openxmlformats.org/drawingml/2006/main" xmlns:r="http://schemas.openxmlformats.org/officeDocument/2006/relationships" xmlns:p="http://schemas.openxmlformats.org/presentationml/2006/main">
+  <p:cSld>
+    <p:spTree>
+      <p:nvGrpSpPr>
+        <p:cNvPr id="1" name=""/>
+        <p:cNvGrpSpPr/>
+        <p:nvPr/>
+      </p:nvGrpSpPr>
+      <p:grpSpPr>
+        <a:xfrm>
+          <a:off x="0" y="0"/>
+          <a:ext cx="0" cy="0"/>
+          <a:chOff x="0" y="0"/>
+          <a:chExt cx="0" cy="0"/>
+        </a:xfrm>
+      </p:grpSpPr>
+      <p:pic>
+        <p:nvPicPr>
+          <p:cNvPr descr="cwe_violent.jpeg" id="0" name="Picture 1"/>
+          <p:cNvPicPr>
+            <a:picLocks noGrp="1" noChangeAspect="1"/>
+          </p:cNvPicPr>
+          <p:nvPr/>
+        </p:nvPicPr>
+        <p:blipFill>
+          <a:blip r:embed="rId2"/>
+          <a:stretch>
+            <a:fillRect/>
+          </a:stretch>
+        </p:blipFill>
+        <p:spPr bwMode="auto">
+          <a:xfrm>
+            <a:off x="457200" y="2019300"/>
+            <a:ext cx="8229600" cy="3683000"/>
+          </a:xfrm>
+          <a:prstGeom prst="rect">
+            <a:avLst/>
+          </a:prstGeom>
+          <a:noFill/>
+          <a:ln w="9525">
+            <a:noFill/>
+            <a:headEnd/>
+            <a:tailEnd/>
+          </a:ln>
+        </p:spPr>
+      </p:pic>
+    </p:spTree>
+  </p:cSld>
+</p:sld>
+</file>
+
+<file path=ppt/slides/slide27.xml><?xml version="1.0" encoding="utf-8"?>
+<p:sld xmlns:a="http://schemas.openxmlformats.org/drawingml/2006/main" xmlns:r="http://schemas.openxmlformats.org/officeDocument/2006/relationships" xmlns:p="http://schemas.openxmlformats.org/presentationml/2006/main">
+  <p:cSld>
+    <p:spTree>
+      <p:nvGrpSpPr>
+        <p:cNvPr id="1" name=""/>
+        <p:cNvGrpSpPr/>
+        <p:nvPr/>
+      </p:nvGrpSpPr>
+      <p:grpSpPr>
+        <a:xfrm>
+          <a:off x="0" y="0"/>
+          <a:ext cx="0" cy="0"/>
+          <a:chOff x="0" y="0"/>
+          <a:chExt cx="0" cy="0"/>
+        </a:xfrm>
+      </p:grpSpPr>
+      <p:pic>
+        <p:nvPicPr>
+          <p:cNvPr descr="cwe_dayNight.jpeg" id="0" name="Picture 1"/>
+          <p:cNvPicPr>
+            <a:picLocks noGrp="1" noChangeAspect="1"/>
+          </p:cNvPicPr>
+          <p:nvPr/>
+        </p:nvPicPr>
+        <p:blipFill>
+          <a:blip r:embed="rId2"/>
+          <a:stretch>
+            <a:fillRect/>
+          </a:stretch>
+        </p:blipFill>
+        <p:spPr bwMode="auto">
+          <a:xfrm>
+            <a:off x="584200" y="1600200"/>
+            <a:ext cx="7975600" cy="4521200"/>
+          </a:xfrm>
+          <a:prstGeom prst="rect">
+            <a:avLst/>
+          </a:prstGeom>
+          <a:noFill/>
+          <a:ln w="9525">
+            <a:noFill/>
+            <a:headEnd/>
+            <a:tailEnd/>
+          </a:ln>
+        </p:spPr>
+      </p:pic>
+    </p:spTree>
+  </p:cSld>
+</p:sld>
+</file>
+
+<file path=ppt/slides/slide28.xml><?xml version="1.0" encoding="utf-8"?>
+<p:sld xmlns:a="http://schemas.openxmlformats.org/drawingml/2006/main" xmlns:r="http://schemas.openxmlformats.org/officeDocument/2006/relationships" xmlns:p="http://schemas.openxmlformats.org/presentationml/2006/main">
+  <p:cSld>
+    <p:spTree>
+      <p:nvGrpSpPr>
+        <p:cNvPr id="1" name=""/>
+        <p:cNvGrpSpPr/>
+        <p:nvPr/>
+      </p:nvGrpSpPr>
+      <p:grpSpPr>
+        <a:xfrm>
+          <a:off x="0" y="0"/>
+          <a:ext cx="0" cy="0"/>
+          <a:chOff x="0" y="0"/>
+          <a:chExt cx="0" cy="0"/>
+        </a:xfrm>
+      </p:grpSpPr>
+      <p:sp>
+        <p:nvSpPr>
+          <p:cNvPr id="2" name="Title 1"/>
+          <p:cNvSpPr>
+            <a:spLocks noGrp="1"/>
+          </p:cNvSpPr>
+          <p:nvPr>
+            <p:ph type="title"/>
+          </p:nvPr>
+        </p:nvSpPr>
+        <p:spPr/>
+        <p:txBody>
+          <a:bodyPr/>
+          <a:lstStyle/>
+          <a:p>
+            <a:pPr lvl="0" marL="0" indent="0">
+              <a:buNone/>
+            </a:pPr>
+            <a:r>
+              <a:rPr/>
+              <a:t>Central</a:t>
+            </a:r>
+            <a:r>
+              <a:rPr/>
+              <a:t> </a:t>
+            </a:r>
+            <a:r>
+              <a:rPr/>
+              <a:t>West</a:t>
+            </a:r>
+            <a:r>
+              <a:rPr/>
+              <a:t> </a:t>
+            </a:r>
+            <a:r>
+              <a:rPr/>
+              <a:t>End</a:t>
+            </a:r>
+            <a:r>
+              <a:rPr/>
+              <a:t> </a:t>
+            </a:r>
+            <a:r>
+              <a:rPr/>
+              <a:t>Total</a:t>
+            </a:r>
+            <a:r>
+              <a:rPr/>
+              <a:t> </a:t>
+            </a:r>
+            <a:r>
+              <a:rPr/>
+              <a:t>Crime</a:t>
+            </a:r>
+          </a:p>
+        </p:txBody>
+      </p:sp>
+      <p:pic>
+        <p:nvPicPr>
+          <p:cNvPr descr="/Users/jesstevens/Documents/professional/wumcrc/safety-and-security/r-crime-mapping/results/cwe/2019/august/cwe_total_crimes.jpeg" id="0" name="Picture 1"/>
+          <p:cNvPicPr>
+            <a:picLocks noGrp="1" noChangeAspect="1"/>
+          </p:cNvPicPr>
+          <p:nvPr/>
+        </p:nvPicPr>
+        <p:blipFill>
+          <a:blip r:embed="rId2"/>
+          <a:stretch>
+            <a:fillRect/>
+          </a:stretch>
+        </p:blipFill>
+        <p:spPr bwMode="auto">
+          <a:xfrm>
+            <a:off x="1981200" y="1600200"/>
+            <a:ext cx="5194300" cy="4521200"/>
+          </a:xfrm>
+          <a:prstGeom prst="rect">
+            <a:avLst/>
+          </a:prstGeom>
+          <a:noFill/>
+          <a:ln w="9525">
+            <a:noFill/>
+            <a:headEnd/>
+            <a:tailEnd/>
+          </a:ln>
+        </p:spPr>
+      </p:pic>
+    </p:spTree>
+  </p:cSld>
+</p:sld>
+</file>
+
+<file path=ppt/slides/slide29.xml><?xml version="1.0" encoding="utf-8"?>
+<p:sld xmlns:a="http://schemas.openxmlformats.org/drawingml/2006/main" xmlns:r="http://schemas.openxmlformats.org/officeDocument/2006/relationships" xmlns:p="http://schemas.openxmlformats.org/presentationml/2006/main">
+  <p:cSld>
+    <p:spTree>
+      <p:nvGrpSpPr>
+        <p:cNvPr id="1" name=""/>
+        <p:cNvGrpSpPr/>
+        <p:nvPr/>
+      </p:nvGrpSpPr>
+      <p:grpSpPr>
+        <a:xfrm>
+          <a:off x="0" y="0"/>
+          <a:ext cx="0" cy="0"/>
+          <a:chOff x="0" y="0"/>
+          <a:chExt cx="0" cy="0"/>
+        </a:xfrm>
+      </p:grpSpPr>
+      <p:sp>
+        <p:nvSpPr>
+          <p:cNvPr id="2" name="Title 1"/>
+          <p:cNvSpPr>
+            <a:spLocks noGrp="1"/>
+          </p:cNvSpPr>
+          <p:nvPr>
+            <p:ph type="title"/>
+          </p:nvPr>
+        </p:nvSpPr>
+        <p:spPr/>
+        <p:txBody>
+          <a:bodyPr/>
+          <a:lstStyle/>
+          <a:p>
+            <a:pPr lvl="0" marL="0" indent="0">
+              <a:buNone/>
+            </a:pPr>
+            <a:r>
+              <a:rPr/>
+              <a:t>FPSE</a:t>
+            </a:r>
+            <a:r>
+              <a:rPr/>
+              <a:t> </a:t>
+            </a:r>
+            <a:r>
+              <a:rPr/>
+              <a:t>Larceny</a:t>
             </a:r>
           </a:p>
         </p:txBody>
@@ -4587,7 +5572,7 @@
             </a:r>
             <a:r>
               <a:rPr/>
-              <a:t>Southeast</a:t>
+              <a:t>Southeast:</a:t>
             </a:r>
             <a:r>
               <a:rPr/>

</xml_diff>